<commit_message>
fixed the use of 'return' in the presentation
</commit_message>
<xml_diff>
--- a/graphics.pptx
+++ b/graphics.pptx
@@ -6,9 +6,10 @@
   </p:sldMasterIdLst>
   <p:sldIdLst>
     <p:sldId id="256" r:id="rId2"/>
-    <p:sldId id="257" r:id="rId3"/>
-    <p:sldId id="258" r:id="rId4"/>
-    <p:sldId id="259" r:id="rId5"/>
+    <p:sldId id="261" r:id="rId3"/>
+    <p:sldId id="262" r:id="rId4"/>
+    <p:sldId id="258" r:id="rId5"/>
+    <p:sldId id="259" r:id="rId6"/>
   </p:sldIdLst>
   <p:sldSz cx="9144000" cy="6858000" type="screen4x3"/>
   <p:notesSz cx="6858000" cy="9144000"/>
@@ -291,7 +292,8 @@
           <a:p>
             <a:fld id="{67489F2F-A761-4C0B-A03D-722C25861376}" type="datetimeFigureOut">
               <a:rPr lang="en-CA" smtClean="0"/>
-              <a:t>2017-04-06</a:t>
+              <a:pPr/>
+              <a:t>2017-04-07</a:t>
             </a:fld>
             <a:endParaRPr lang="en-CA"/>
           </a:p>
@@ -333,6 +335,7 @@
           <a:p>
             <a:fld id="{E790022D-B2DB-4A03-B92A-C6CF6F4DBFC4}" type="slidenum">
               <a:rPr lang="en-CA" smtClean="0"/>
+              <a:pPr/>
               <a:t>‹#›</a:t>
             </a:fld>
             <a:endParaRPr lang="en-CA"/>
@@ -456,7 +459,8 @@
           <a:p>
             <a:fld id="{67489F2F-A761-4C0B-A03D-722C25861376}" type="datetimeFigureOut">
               <a:rPr lang="en-CA" smtClean="0"/>
-              <a:t>2017-04-06</a:t>
+              <a:pPr/>
+              <a:t>2017-04-07</a:t>
             </a:fld>
             <a:endParaRPr lang="en-CA"/>
           </a:p>
@@ -498,6 +502,7 @@
           <a:p>
             <a:fld id="{E790022D-B2DB-4A03-B92A-C6CF6F4DBFC4}" type="slidenum">
               <a:rPr lang="en-CA" smtClean="0"/>
+              <a:pPr/>
               <a:t>‹#›</a:t>
             </a:fld>
             <a:endParaRPr lang="en-CA"/>
@@ -631,7 +636,8 @@
           <a:p>
             <a:fld id="{67489F2F-A761-4C0B-A03D-722C25861376}" type="datetimeFigureOut">
               <a:rPr lang="en-CA" smtClean="0"/>
-              <a:t>2017-04-06</a:t>
+              <a:pPr/>
+              <a:t>2017-04-07</a:t>
             </a:fld>
             <a:endParaRPr lang="en-CA"/>
           </a:p>
@@ -673,6 +679,7 @@
           <a:p>
             <a:fld id="{E790022D-B2DB-4A03-B92A-C6CF6F4DBFC4}" type="slidenum">
               <a:rPr lang="en-CA" smtClean="0"/>
+              <a:pPr/>
               <a:t>‹#›</a:t>
             </a:fld>
             <a:endParaRPr lang="en-CA"/>
@@ -796,7 +803,8 @@
           <a:p>
             <a:fld id="{67489F2F-A761-4C0B-A03D-722C25861376}" type="datetimeFigureOut">
               <a:rPr lang="en-CA" smtClean="0"/>
-              <a:t>2017-04-06</a:t>
+              <a:pPr/>
+              <a:t>2017-04-07</a:t>
             </a:fld>
             <a:endParaRPr lang="en-CA"/>
           </a:p>
@@ -838,6 +846,7 @@
           <a:p>
             <a:fld id="{E790022D-B2DB-4A03-B92A-C6CF6F4DBFC4}" type="slidenum">
               <a:rPr lang="en-CA" smtClean="0"/>
+              <a:pPr/>
               <a:t>‹#›</a:t>
             </a:fld>
             <a:endParaRPr lang="en-CA"/>
@@ -1037,7 +1046,8 @@
           <a:p>
             <a:fld id="{67489F2F-A761-4C0B-A03D-722C25861376}" type="datetimeFigureOut">
               <a:rPr lang="en-CA" smtClean="0"/>
-              <a:t>2017-04-06</a:t>
+              <a:pPr/>
+              <a:t>2017-04-07</a:t>
             </a:fld>
             <a:endParaRPr lang="en-CA"/>
           </a:p>
@@ -1079,6 +1089,7 @@
           <a:p>
             <a:fld id="{E790022D-B2DB-4A03-B92A-C6CF6F4DBFC4}" type="slidenum">
               <a:rPr lang="en-CA" smtClean="0"/>
+              <a:pPr/>
               <a:t>‹#›</a:t>
             </a:fld>
             <a:endParaRPr lang="en-CA"/>
@@ -1320,7 +1331,8 @@
           <a:p>
             <a:fld id="{67489F2F-A761-4C0B-A03D-722C25861376}" type="datetimeFigureOut">
               <a:rPr lang="en-CA" smtClean="0"/>
-              <a:t>2017-04-06</a:t>
+              <a:pPr/>
+              <a:t>2017-04-07</a:t>
             </a:fld>
             <a:endParaRPr lang="en-CA"/>
           </a:p>
@@ -1362,6 +1374,7 @@
           <a:p>
             <a:fld id="{E790022D-B2DB-4A03-B92A-C6CF6F4DBFC4}" type="slidenum">
               <a:rPr lang="en-CA" smtClean="0"/>
+              <a:pPr/>
               <a:t>‹#›</a:t>
             </a:fld>
             <a:endParaRPr lang="en-CA"/>
@@ -1737,7 +1750,8 @@
           <a:p>
             <a:fld id="{67489F2F-A761-4C0B-A03D-722C25861376}" type="datetimeFigureOut">
               <a:rPr lang="en-CA" smtClean="0"/>
-              <a:t>2017-04-06</a:t>
+              <a:pPr/>
+              <a:t>2017-04-07</a:t>
             </a:fld>
             <a:endParaRPr lang="en-CA"/>
           </a:p>
@@ -1779,6 +1793,7 @@
           <a:p>
             <a:fld id="{E790022D-B2DB-4A03-B92A-C6CF6F4DBFC4}" type="slidenum">
               <a:rPr lang="en-CA" smtClean="0"/>
+              <a:pPr/>
               <a:t>‹#›</a:t>
             </a:fld>
             <a:endParaRPr lang="en-CA"/>
@@ -1850,7 +1865,8 @@
           <a:p>
             <a:fld id="{67489F2F-A761-4C0B-A03D-722C25861376}" type="datetimeFigureOut">
               <a:rPr lang="en-CA" smtClean="0"/>
-              <a:t>2017-04-06</a:t>
+              <a:pPr/>
+              <a:t>2017-04-07</a:t>
             </a:fld>
             <a:endParaRPr lang="en-CA"/>
           </a:p>
@@ -1892,6 +1908,7 @@
           <a:p>
             <a:fld id="{E790022D-B2DB-4A03-B92A-C6CF6F4DBFC4}" type="slidenum">
               <a:rPr lang="en-CA" smtClean="0"/>
+              <a:pPr/>
               <a:t>‹#›</a:t>
             </a:fld>
             <a:endParaRPr lang="en-CA"/>
@@ -1940,7 +1957,8 @@
           <a:p>
             <a:fld id="{67489F2F-A761-4C0B-A03D-722C25861376}" type="datetimeFigureOut">
               <a:rPr lang="en-CA" smtClean="0"/>
-              <a:t>2017-04-06</a:t>
+              <a:pPr/>
+              <a:t>2017-04-07</a:t>
             </a:fld>
             <a:endParaRPr lang="en-CA"/>
           </a:p>
@@ -1982,6 +2000,7 @@
           <a:p>
             <a:fld id="{E790022D-B2DB-4A03-B92A-C6CF6F4DBFC4}" type="slidenum">
               <a:rPr lang="en-CA" smtClean="0"/>
+              <a:pPr/>
               <a:t>‹#›</a:t>
             </a:fld>
             <a:endParaRPr lang="en-CA"/>
@@ -2212,7 +2231,8 @@
           <a:p>
             <a:fld id="{67489F2F-A761-4C0B-A03D-722C25861376}" type="datetimeFigureOut">
               <a:rPr lang="en-CA" smtClean="0"/>
-              <a:t>2017-04-06</a:t>
+              <a:pPr/>
+              <a:t>2017-04-07</a:t>
             </a:fld>
             <a:endParaRPr lang="en-CA"/>
           </a:p>
@@ -2254,6 +2274,7 @@
           <a:p>
             <a:fld id="{E790022D-B2DB-4A03-B92A-C6CF6F4DBFC4}" type="slidenum">
               <a:rPr lang="en-CA" smtClean="0"/>
+              <a:pPr/>
               <a:t>‹#›</a:t>
             </a:fld>
             <a:endParaRPr lang="en-CA"/>
@@ -2460,7 +2481,8 @@
           <a:p>
             <a:fld id="{67489F2F-A761-4C0B-A03D-722C25861376}" type="datetimeFigureOut">
               <a:rPr lang="en-CA" smtClean="0"/>
-              <a:t>2017-04-06</a:t>
+              <a:pPr/>
+              <a:t>2017-04-07</a:t>
             </a:fld>
             <a:endParaRPr lang="en-CA"/>
           </a:p>
@@ -2502,6 +2524,7 @@
           <a:p>
             <a:fld id="{E790022D-B2DB-4A03-B92A-C6CF6F4DBFC4}" type="slidenum">
               <a:rPr lang="en-CA" smtClean="0"/>
+              <a:pPr/>
               <a:t>‹#›</a:t>
             </a:fld>
             <a:endParaRPr lang="en-CA"/>
@@ -2668,7 +2691,8 @@
           <a:p>
             <a:fld id="{67489F2F-A761-4C0B-A03D-722C25861376}" type="datetimeFigureOut">
               <a:rPr lang="en-CA" smtClean="0"/>
-              <a:t>2017-04-06</a:t>
+              <a:pPr/>
+              <a:t>2017-04-07</a:t>
             </a:fld>
             <a:endParaRPr lang="en-CA"/>
           </a:p>
@@ -2746,6 +2770,7 @@
           <a:p>
             <a:fld id="{E790022D-B2DB-4A03-B92A-C6CF6F4DBFC4}" type="slidenum">
               <a:rPr lang="en-CA" smtClean="0"/>
+              <a:pPr/>
               <a:t>‹#›</a:t>
             </a:fld>
             <a:endParaRPr lang="en-CA"/>
@@ -4302,7 +4327,7 @@
       </p:grpSpPr>
       <p:grpSp>
         <p:nvGrpSpPr>
-          <p:cNvPr id="27" name="Group 26"/>
+          <p:cNvPr id="2" name="Group 26"/>
           <p:cNvGrpSpPr/>
           <p:nvPr/>
         </p:nvGrpSpPr>
@@ -4568,7 +4593,7 @@
           <p:spPr>
             <a:xfrm>
               <a:off x="2123728" y="3068960"/>
-              <a:ext cx="1296144" cy="646331"/>
+              <a:ext cx="1296144" cy="369332"/>
             </a:xfrm>
             <a:prstGeom prst="rect">
               <a:avLst/>
@@ -4583,7 +4608,7 @@
             <a:p>
               <a:r>
                 <a:rPr lang="en-CA" dirty="0" smtClean="0"/>
-                <a:t>Negative returns</a:t>
+                <a:t>Negatives</a:t>
               </a:r>
               <a:endParaRPr lang="en-CA" dirty="0"/>
             </a:p>
@@ -4598,7 +4623,7 @@
           <p:spPr>
             <a:xfrm>
               <a:off x="4860032" y="3070701"/>
-              <a:ext cx="1296144" cy="646331"/>
+              <a:ext cx="1296144" cy="369332"/>
             </a:xfrm>
             <a:prstGeom prst="rect">
               <a:avLst/>
@@ -4613,7 +4638,7 @@
             <a:p>
               <a:r>
                 <a:rPr lang="en-CA" dirty="0" smtClean="0"/>
-                <a:t>Positive returns</a:t>
+                <a:t>Positives</a:t>
               </a:r>
               <a:endParaRPr lang="en-CA" dirty="0"/>
             </a:p>
@@ -4807,7 +4832,7 @@
             <a:p>
               <a:r>
                 <a:rPr lang="en-CA" sz="2000" b="1" dirty="0" smtClean="0"/>
-                <a:t>Ĝ</a:t>
+                <a:t>Û</a:t>
               </a:r>
               <a:r>
                 <a:rPr lang="en-CA" sz="2000" b="1" baseline="-25000" dirty="0" smtClean="0"/>
@@ -4841,7 +4866,7 @@
             <a:p>
               <a:r>
                 <a:rPr lang="en-CA" sz="2000" b="1" dirty="0" smtClean="0"/>
-                <a:t>Ĝ</a:t>
+                <a:t>Û</a:t>
               </a:r>
               <a:r>
                 <a:rPr lang="en-CA" sz="2000" b="1" baseline="-25000" dirty="0" smtClean="0"/>
@@ -4875,10 +4900,10 @@
             <a:p>
               <a:r>
                 <a:rPr lang="en-CA" sz="2000" b="1" dirty="0" err="1" smtClean="0"/>
-                <a:t>Ĝ</a:t>
+                <a:t>Û</a:t>
               </a:r>
               <a:r>
-                <a:rPr lang="en-CA" sz="2000" b="1" baseline="-25000" dirty="0" err="1"/>
+                <a:rPr lang="en-CA" sz="2000" b="1" baseline="-25000" dirty="0" err="1" smtClean="0"/>
                 <a:t>x</a:t>
               </a:r>
               <a:endParaRPr lang="en-CA" sz="2000" b="1" baseline="-25000" dirty="0"/>
@@ -4886,6 +4911,37 @@
           </p:txBody>
         </p:sp>
       </p:grpSp>
+      <p:sp>
+        <p:nvSpPr>
+          <p:cNvPr id="18" name="TextBox 17"/>
+          <p:cNvSpPr txBox="1"/>
+          <p:nvPr/>
+        </p:nvSpPr>
+        <p:spPr>
+          <a:xfrm>
+            <a:off x="683568" y="6093296"/>
+            <a:ext cx="3744416" cy="369332"/>
+          </a:xfrm>
+          <a:prstGeom prst="rect">
+            <a:avLst/>
+          </a:prstGeom>
+          <a:noFill/>
+        </p:spPr>
+        <p:txBody>
+          <a:bodyPr wrap="square" rtlCol="0">
+            <a:spAutoFit/>
+          </a:bodyPr>
+          <a:lstStyle/>
+          <a:p>
+            <a:pPr algn="ctr"/>
+            <a:r>
+              <a:rPr lang="en-CA" dirty="0" smtClean="0"/>
+              <a:t>Sum of state values along trajectory</a:t>
+            </a:r>
+            <a:endParaRPr lang="en-CA" dirty="0"/>
+          </a:p>
+        </p:txBody>
+      </p:sp>
     </p:spTree>
   </p:cSld>
   <p:clrMapOvr>
@@ -4913,54 +4969,28 @@
       </p:grpSpPr>
       <p:grpSp>
         <p:nvGrpSpPr>
-          <p:cNvPr id="21" name="Group 20"/>
+          <p:cNvPr id="20" name="Group 19"/>
           <p:cNvGrpSpPr/>
           <p:nvPr/>
         </p:nvGrpSpPr>
         <p:grpSpPr>
           <a:xfrm>
-            <a:off x="1115616" y="1124744"/>
-            <a:ext cx="6400800" cy="3537684"/>
-            <a:chOff x="1115616" y="1124744"/>
-            <a:chExt cx="6400800" cy="3537684"/>
+            <a:off x="1331640" y="1196752"/>
+            <a:ext cx="6400800" cy="3465676"/>
+            <a:chOff x="1331640" y="1196752"/>
+            <a:chExt cx="6400800" cy="3465676"/>
           </a:xfrm>
         </p:grpSpPr>
-        <p:pic>
-          <p:nvPicPr>
-            <p:cNvPr id="1026" name="Picture 2" descr="D:\Users\Charley\Desktop\illustration_of_discriminator.png"/>
-            <p:cNvPicPr>
-              <a:picLocks noChangeAspect="1" noChangeArrowheads="1"/>
-            </p:cNvPicPr>
-            <p:nvPr/>
-          </p:nvPicPr>
-          <p:blipFill>
-            <a:blip r:embed="rId2" cstate="print"/>
-            <a:srcRect t="12465" b="25209"/>
-            <a:stretch>
-              <a:fillRect/>
-            </a:stretch>
-          </p:blipFill>
-          <p:spPr bwMode="auto">
-            <a:xfrm>
-              <a:off x="1115616" y="1124744"/>
-              <a:ext cx="6400800" cy="3240360"/>
-            </a:xfrm>
-            <a:prstGeom prst="rect">
-              <a:avLst/>
-            </a:prstGeom>
-            <a:noFill/>
-          </p:spPr>
-        </p:pic>
         <p:sp>
           <p:nvSpPr>
-            <p:cNvPr id="20" name="TextBox 19"/>
+            <p:cNvPr id="18" name="TextBox 17"/>
             <p:cNvSpPr txBox="1"/>
             <p:nvPr/>
           </p:nvSpPr>
           <p:spPr>
             <a:xfrm>
-              <a:off x="3419872" y="4293096"/>
-              <a:ext cx="1656184" cy="369332"/>
+              <a:off x="2627784" y="4293096"/>
+              <a:ext cx="3744416" cy="369332"/>
             </a:xfrm>
             <a:prstGeom prst="rect">
               <a:avLst/>
@@ -4976,12 +5006,38 @@
               <a:pPr algn="ctr"/>
               <a:r>
                 <a:rPr lang="en-CA" dirty="0" smtClean="0"/>
-                <a:t>Returns</a:t>
+                <a:t>Sum of state values along trajectory</a:t>
               </a:r>
               <a:endParaRPr lang="en-CA" dirty="0"/>
             </a:p>
           </p:txBody>
         </p:sp>
+        <p:pic>
+          <p:nvPicPr>
+            <p:cNvPr id="2050" name="Picture 2" descr="D:\Users\Charley\Desktop\illustration_of_discriminator.png"/>
+            <p:cNvPicPr>
+              <a:picLocks noChangeAspect="1" noChangeArrowheads="1"/>
+            </p:cNvPicPr>
+            <p:nvPr/>
+          </p:nvPicPr>
+          <p:blipFill>
+            <a:blip r:embed="rId2" cstate="print"/>
+            <a:srcRect t="13850" b="26594"/>
+            <a:stretch>
+              <a:fillRect/>
+            </a:stretch>
+          </p:blipFill>
+          <p:spPr bwMode="auto">
+            <a:xfrm>
+              <a:off x="1331640" y="1196752"/>
+              <a:ext cx="6400800" cy="3096344"/>
+            </a:xfrm>
+            <a:prstGeom prst="rect">
+              <a:avLst/>
+            </a:prstGeom>
+            <a:noFill/>
+          </p:spPr>
+        </p:pic>
       </p:grpSp>
     </p:spTree>
   </p:cSld>
@@ -4992,6 +5048,88 @@
 </file>
 
 <file path=ppt/slides/slide4.xml><?xml version="1.0" encoding="utf-8"?>
+<p:sld xmlns:a="http://schemas.openxmlformats.org/drawingml/2006/main" xmlns:r="http://schemas.openxmlformats.org/officeDocument/2006/relationships" xmlns:p="http://schemas.openxmlformats.org/presentationml/2006/main">
+  <p:cSld>
+    <p:spTree>
+      <p:nvGrpSpPr>
+        <p:cNvPr id="1" name=""/>
+        <p:cNvGrpSpPr/>
+        <p:nvPr/>
+      </p:nvGrpSpPr>
+      <p:grpSpPr>
+        <a:xfrm>
+          <a:off x="0" y="0"/>
+          <a:ext cx="0" cy="0"/>
+          <a:chOff x="0" y="0"/>
+          <a:chExt cx="0" cy="0"/>
+        </a:xfrm>
+      </p:grpSpPr>
+      <p:pic>
+        <p:nvPicPr>
+          <p:cNvPr id="1026" name="Picture 2" descr="D:\Users\Charley\Desktop\illustration_of_discriminator.png"/>
+          <p:cNvPicPr>
+            <a:picLocks noChangeAspect="1" noChangeArrowheads="1"/>
+          </p:cNvPicPr>
+          <p:nvPr/>
+        </p:nvPicPr>
+        <p:blipFill>
+          <a:blip r:embed="rId2" cstate="print"/>
+          <a:srcRect t="12465" b="25209"/>
+          <a:stretch>
+            <a:fillRect/>
+          </a:stretch>
+        </p:blipFill>
+        <p:spPr bwMode="auto">
+          <a:xfrm>
+            <a:off x="1115616" y="1124744"/>
+            <a:ext cx="6400800" cy="3240360"/>
+          </a:xfrm>
+          <a:prstGeom prst="rect">
+            <a:avLst/>
+          </a:prstGeom>
+          <a:noFill/>
+        </p:spPr>
+      </p:pic>
+      <p:sp>
+        <p:nvSpPr>
+          <p:cNvPr id="20" name="TextBox 19"/>
+          <p:cNvSpPr txBox="1"/>
+          <p:nvPr/>
+        </p:nvSpPr>
+        <p:spPr>
+          <a:xfrm>
+            <a:off x="3419872" y="4293096"/>
+            <a:ext cx="1656184" cy="369332"/>
+          </a:xfrm>
+          <a:prstGeom prst="rect">
+            <a:avLst/>
+          </a:prstGeom>
+          <a:noFill/>
+        </p:spPr>
+        <p:txBody>
+          <a:bodyPr wrap="square" rtlCol="0">
+            <a:spAutoFit/>
+          </a:bodyPr>
+          <a:lstStyle/>
+          <a:p>
+            <a:pPr algn="ctr"/>
+            <a:r>
+              <a:rPr lang="en-CA" dirty="0" smtClean="0"/>
+              <a:t>Returns</a:t>
+            </a:r>
+            <a:endParaRPr lang="en-CA" dirty="0"/>
+          </a:p>
+        </p:txBody>
+      </p:sp>
+    </p:spTree>
+  </p:cSld>
+  <p:clrMapOvr>
+    <a:masterClrMapping/>
+  </p:clrMapOvr>
+</p:sld>
+</file>
+
+<file path=ppt/slides/slide5.xml><?xml version="1.0" encoding="utf-8"?>
 <p:sld xmlns:a="http://schemas.openxmlformats.org/drawingml/2006/main" xmlns:r="http://schemas.openxmlformats.org/officeDocument/2006/relationships" xmlns:p="http://schemas.openxmlformats.org/presentationml/2006/main">
   <p:cSld>
     <p:spTree>

</xml_diff>